<commit_message>
More Spanish templates fixed
</commit_message>
<xml_diff>
--- a/_site/translations/es/intermediate/Infrared.pptx
+++ b/_site/translations/es/intermediate/Infrared.pptx
@@ -223,7 +223,7 @@
           <a:p>
             <a:fld id="{E354B44E-40A3-0E46-B16A-9BF1250A248B}" type="datetimeFigureOut">
               <a:rPr lang="en-US" smtClean="0"/>
-              <a:t>2/5/17</a:t>
+              <a:t>2/11/17</a:t>
             </a:fld>
             <a:endParaRPr lang="en-US"/>
           </a:p>
@@ -389,7 +389,7 @@
           <a:p>
             <a:fld id="{C86AD16C-2DB4-6642-BAD4-9ED973A087A0}" type="datetimeFigureOut">
               <a:rPr lang="en-US" smtClean="0"/>
-              <a:t>2/5/17</a:t>
+              <a:t>2/11/17</a:t>
             </a:fld>
             <a:endParaRPr lang="en-US"/>
           </a:p>
@@ -1014,7 +1014,7 @@
           <a:p>
             <a:fld id="{037B7D8F-1D39-844A-98F9-1F8FEC5E95E9}" type="datetime1">
               <a:rPr lang="en-US" smtClean="0"/>
-              <a:t>2/5/17</a:t>
+              <a:t>2/11/17</a:t>
             </a:fld>
             <a:endParaRPr lang="en-US"/>
           </a:p>
@@ -1274,7 +1274,7 @@
           <a:noFill/>
           <a:extLst>
             <a:ext uri="{909E8E84-426E-40dd-AFC4-6F175D3DCCD1}">
-              <a14:hiddenFill xmlns:a14="http://schemas.microsoft.com/office/drawing/2010/main" xmlns="">
+              <a14:hiddenFill xmlns="" xmlns:a14="http://schemas.microsoft.com/office/drawing/2010/main">
                 <a:solidFill>
                   <a:srgbClr val="FFFFFF"/>
                 </a:solidFill>
@@ -1405,7 +1405,7 @@
           <a:p>
             <a:fld id="{2A2AC84E-80CD-0142-B847-E962554713B6}" type="datetime1">
               <a:rPr lang="en-US" smtClean="0"/>
-              <a:t>2/5/17</a:t>
+              <a:t>2/11/17</a:t>
             </a:fld>
             <a:endParaRPr lang="en-US"/>
           </a:p>
@@ -1664,7 +1664,7 @@
           <a:p>
             <a:fld id="{B06148A5-EEB0-C548-A393-2C0DE6EB8DC6}" type="datetime1">
               <a:rPr lang="en-US" smtClean="0"/>
-              <a:t>2/5/17</a:t>
+              <a:t>2/11/17</a:t>
             </a:fld>
             <a:endParaRPr lang="en-US"/>
           </a:p>
@@ -1918,7 +1918,7 @@
           <a:p>
             <a:fld id="{387994FA-CFCB-BB4C-A421-CF3326C0CEFF}" type="datetime1">
               <a:rPr lang="en-US" smtClean="0"/>
-              <a:t>2/5/17</a:t>
+              <a:t>2/11/17</a:t>
             </a:fld>
             <a:endParaRPr lang="en-US"/>
           </a:p>
@@ -2363,7 +2363,7 @@
           <a:p>
             <a:fld id="{709F33C3-2540-8B49-B8BA-6EC6CA10B4F4}" type="datetime1">
               <a:rPr lang="en-US" smtClean="0"/>
-              <a:t>2/5/17</a:t>
+              <a:t>2/11/17</a:t>
             </a:fld>
             <a:endParaRPr lang="en-US"/>
           </a:p>
@@ -2709,7 +2709,7 @@
           <a:p>
             <a:fld id="{FCFE905D-2317-7946-AD46-75209F9C3417}" type="datetime1">
               <a:rPr lang="en-US" smtClean="0"/>
-              <a:t>2/5/17</a:t>
+              <a:t>2/11/17</a:t>
             </a:fld>
             <a:endParaRPr lang="en-US"/>
           </a:p>
@@ -2987,7 +2987,7 @@
           <a:p>
             <a:fld id="{0DE92AEB-114A-9741-B52B-50C533E37095}" type="datetime1">
               <a:rPr lang="en-US" smtClean="0"/>
-              <a:t>2/5/17</a:t>
+              <a:t>2/11/17</a:t>
             </a:fld>
             <a:endParaRPr lang="en-US"/>
           </a:p>
@@ -3370,7 +3370,7 @@
           <a:p>
             <a:fld id="{6E285901-F10F-B74E-BAE0-B559708989C2}" type="datetime1">
               <a:rPr lang="en-US" smtClean="0"/>
-              <a:t>2/5/17</a:t>
+              <a:t>2/11/17</a:t>
             </a:fld>
             <a:endParaRPr lang="en-US"/>
           </a:p>
@@ -3491,7 +3491,7 @@
           <a:p>
             <a:fld id="{5F159AE2-52E1-144A-86A3-14E9818A79A6}" type="datetime1">
               <a:rPr lang="en-US" smtClean="0"/>
-              <a:t>2/5/17</a:t>
+              <a:t>2/11/17</a:t>
             </a:fld>
             <a:endParaRPr lang="en-US"/>
           </a:p>
@@ -3665,7 +3665,7 @@
           <a:p>
             <a:fld id="{6E144511-5A26-5F49-9272-03E93C7EE54A}" type="datetime1">
               <a:rPr lang="en-US" smtClean="0"/>
-              <a:t>2/5/17</a:t>
+              <a:t>2/11/17</a:t>
             </a:fld>
             <a:endParaRPr lang="en-US"/>
           </a:p>
@@ -4022,7 +4022,7 @@
           <a:p>
             <a:fld id="{ACD74F50-91F0-7748-8CDC-8D4DEDE0BCFC}" type="datetime1">
               <a:rPr lang="en-US" smtClean="0"/>
-              <a:t>2/5/17</a:t>
+              <a:t>2/11/17</a:t>
             </a:fld>
             <a:endParaRPr lang="en-US"/>
           </a:p>
@@ -4216,7 +4216,7 @@
           <a:p>
             <a:fld id="{E8D9D204-D5FB-2B43-BDA3-63C5B2FC8BEA}" type="datetime1">
               <a:rPr lang="en-US" smtClean="0"/>
-              <a:t>2/5/17</a:t>
+              <a:t>2/11/17</a:t>
             </a:fld>
             <a:endParaRPr lang="en-US"/>
           </a:p>
@@ -4580,7 +4580,7 @@
           <a:p>
             <a:fld id="{50759E8F-1CB7-C648-B1A4-A87B8758C6A9}" type="datetime1">
               <a:rPr lang="en-US" smtClean="0"/>
-              <a:t>2/5/17</a:t>
+              <a:t>2/11/17</a:t>
             </a:fld>
             <a:endParaRPr lang="en-US"/>
           </a:p>
@@ -4753,7 +4753,7 @@
           <a:p>
             <a:fld id="{9494086B-E7BC-E84D-8ECF-55A1C9EB1325}" type="datetime1">
               <a:rPr lang="en-US" smtClean="0"/>
-              <a:t>2/5/17</a:t>
+              <a:t>2/11/17</a:t>
             </a:fld>
             <a:endParaRPr lang="en-US"/>
           </a:p>
@@ -5012,7 +5012,7 @@
           <a:p>
             <a:fld id="{A425802E-8367-E44F-89D5-76243D80D121}" type="datetime1">
               <a:rPr lang="en-US" smtClean="0"/>
-              <a:t>2/5/17</a:t>
+              <a:t>2/11/17</a:t>
             </a:fld>
             <a:endParaRPr lang="en-US"/>
           </a:p>
@@ -5358,7 +5358,7 @@
           <a:p>
             <a:fld id="{4E4A9C57-DC22-6B4F-A42C-BDC3F0F1557F}" type="datetime1">
               <a:rPr lang="en-US" smtClean="0"/>
-              <a:t>2/5/17</a:t>
+              <a:t>2/11/17</a:t>
             </a:fld>
             <a:endParaRPr lang="en-US"/>
           </a:p>
@@ -5636,7 +5636,7 @@
           <a:p>
             <a:fld id="{D551841A-313E-164E-A9B9-21F692EBB0B2}" type="datetime1">
               <a:rPr lang="en-US" smtClean="0"/>
-              <a:t>2/5/17</a:t>
+              <a:t>2/11/17</a:t>
             </a:fld>
             <a:endParaRPr lang="en-US"/>
           </a:p>
@@ -6019,7 +6019,7 @@
           <a:p>
             <a:fld id="{EBDA0CDF-5696-9948-BFB5-A81AF243A8C2}" type="datetime1">
               <a:rPr lang="en-US" smtClean="0"/>
-              <a:t>2/5/17</a:t>
+              <a:t>2/11/17</a:t>
             </a:fld>
             <a:endParaRPr lang="en-US"/>
           </a:p>
@@ -6140,7 +6140,7 @@
           <a:p>
             <a:fld id="{8178F562-728D-6A43-83A1-CD1D430C5D27}" type="datetime1">
               <a:rPr lang="en-US" smtClean="0"/>
-              <a:t>2/5/17</a:t>
+              <a:t>2/11/17</a:t>
             </a:fld>
             <a:endParaRPr lang="en-US"/>
           </a:p>
@@ -6314,7 +6314,7 @@
           <a:p>
             <a:fld id="{79F25D7D-B2CA-1544-9DE3-F8F80196DB9E}" type="datetime1">
               <a:rPr lang="en-US" smtClean="0"/>
-              <a:t>2/5/17</a:t>
+              <a:t>2/11/17</a:t>
             </a:fld>
             <a:endParaRPr lang="en-US"/>
           </a:p>
@@ -6671,7 +6671,7 @@
           <a:p>
             <a:fld id="{8E248D88-CAB6-AC4E-B42F-E5CFDD231205}" type="datetime1">
               <a:rPr lang="en-US" smtClean="0"/>
-              <a:t>2/5/17</a:t>
+              <a:t>2/11/17</a:t>
             </a:fld>
             <a:endParaRPr lang="en-US"/>
           </a:p>
@@ -7056,7 +7056,7 @@
           <a:p>
             <a:fld id="{8D47035E-4F8F-2E44-9AD5-8D4D2849A43C}" type="datetime1">
               <a:rPr lang="en-US" smtClean="0"/>
-              <a:t>2/5/17</a:t>
+              <a:t>2/11/17</a:t>
             </a:fld>
             <a:endParaRPr lang="en-US"/>
           </a:p>
@@ -7348,7 +7348,7 @@
           <a:p>
             <a:fld id="{D0F1E2AF-A7B1-E14F-B361-45C5115B80B5}" type="datetime1">
               <a:rPr lang="en-US" smtClean="0"/>
-              <a:t>2/5/17</a:t>
+              <a:t>2/11/17</a:t>
             </a:fld>
             <a:endParaRPr lang="en-US" dirty="0"/>
           </a:p>
@@ -8126,7 +8126,7 @@
           <a:p>
             <a:fld id="{858D7A99-3C2B-C146-907A-12AFA83A8870}" type="datetime1">
               <a:rPr lang="en-US" smtClean="0"/>
-              <a:t>2/5/17</a:t>
+              <a:t>2/11/17</a:t>
             </a:fld>
             <a:endParaRPr lang="en-US" dirty="0"/>
           </a:p>
@@ -9252,7 +9252,7 @@
           <a:effectLst/>
           <a:extLst>
             <a:ext uri="{91240B29-F687-4f45-9708-019B960494DF}">
-              <a14:hiddenLine xmlns="" xmlns:a14="http://schemas.microsoft.com/office/drawing/2010/main" w="9525">
+              <a14:hiddenLine xmlns:a14="http://schemas.microsoft.com/office/drawing/2010/main" xmlns="" w="9525">
                 <a:solidFill>
                   <a:schemeClr val="tx1"/>
                 </a:solidFill>
@@ -9262,7 +9262,7 @@
               </a14:hiddenLine>
             </a:ext>
             <a:ext uri="{AF507438-7753-43e0-B8FC-AC1667EBCBE1}">
-              <a14:hiddenEffects xmlns="" xmlns:a14="http://schemas.microsoft.com/office/drawing/2010/main">
+              <a14:hiddenEffects xmlns:a14="http://schemas.microsoft.com/office/drawing/2010/main" xmlns="">
                 <a:effectLst>
                   <a:outerShdw dist="35921" dir="2700000" algn="ctr" rotWithShape="0">
                     <a:schemeClr val="bg2"/>
@@ -9408,22 +9408,7 @@
             </a:lvl9pPr>
           </a:lstStyle>
           <a:p>
-            <a:pPr marL="0" marR="0" lvl="0" indent="0" algn="ctr" defTabSz="914400" rtl="0" eaLnBrk="0" fontAlgn="base" latinLnBrk="0" hangingPunct="0">
-              <a:lnSpc>
-                <a:spcPct val="100000"/>
-              </a:lnSpc>
-              <a:spcBef>
-                <a:spcPct val="0"/>
-              </a:spcBef>
-              <a:spcAft>
-                <a:spcPct val="0"/>
-              </a:spcAft>
-              <a:buClrTx/>
-              <a:buSzTx/>
-              <a:buFontTx/>
-              <a:buNone/>
-              <a:tabLst/>
-            </a:pPr>
+            <a:pPr lvl="0" algn="ctr"/>
             <a:r>
               <a:rPr kumimoji="0" lang="en-US" altLang="en-US" sz="2000" b="0" i="0" u="none" strike="noStrike" cap="none" normalizeH="0" baseline="0" dirty="0">
                 <a:ln>
@@ -9461,6 +9446,15 @@
               </a:rPr>
             </a:br>
             <a:r>
+              <a:rPr lang="x-none" altLang="en-US" sz="2000">
+                <a:solidFill>
+                  <a:srgbClr val="000000"/>
+                </a:solidFill>
+                <a:latin typeface="Helvetica Neue"/>
+              </a:rPr>
+              <a:t> Este trabajo tiene licencia bajo </a:t>
+            </a:r>
+            <a:r>
               <a:rPr kumimoji="0" lang="en-US" altLang="en-US" sz="2000" b="0" i="0" u="none" strike="noStrike" cap="none" normalizeH="0" baseline="0" dirty="0">
                 <a:ln>
                   <a:noFill/>
@@ -9471,7 +9465,7 @@
                 <a:effectLst/>
                 <a:latin typeface="Helvetica Neue"/>
               </a:rPr>
-              <a:t>This work is licensed under a </a:t>
+              <a:t> </a:t>
             </a:r>
             <a:r>
               <a:rPr kumimoji="0" lang="en-US" altLang="en-US" sz="2000" b="0" i="0" u="none" strike="noStrike" cap="none" normalizeH="0" baseline="0" dirty="0">
@@ -9615,7 +9609,7 @@
           <a:noFill/>
           <a:extLst>
             <a:ext uri="{909E8E84-426E-40dd-AFC4-6F175D3DCCD1}">
-              <a14:hiddenFill xmlns="" xmlns:a14="http://schemas.microsoft.com/office/drawing/2010/main">
+              <a14:hiddenFill xmlns:a14="http://schemas.microsoft.com/office/drawing/2010/main" xmlns="">
                 <a:solidFill>
                   <a:srgbClr val="FFFFFF"/>
                 </a:solidFill>
@@ -10575,14 +10569,14 @@
                 <a:gridCol w="1528287">
                   <a:extLst>
                     <a:ext uri="{9D8B030D-6E8A-4147-A177-3AD203B41FA5}">
-                      <a16:colId xmlns:a16="http://schemas.microsoft.com/office/drawing/2014/main" xmlns="" val="20000"/>
+                      <a16:colId xmlns="" xmlns:a16="http://schemas.microsoft.com/office/drawing/2014/main" val="20000"/>
                     </a:ext>
                   </a:extLst>
                 </a:gridCol>
                 <a:gridCol w="6485052">
                   <a:extLst>
                     <a:ext uri="{9D8B030D-6E8A-4147-A177-3AD203B41FA5}">
-                      <a16:colId xmlns:a16="http://schemas.microsoft.com/office/drawing/2014/main" xmlns="" val="20001"/>
+                      <a16:colId xmlns="" xmlns:a16="http://schemas.microsoft.com/office/drawing/2014/main" val="20001"/>
                     </a:ext>
                   </a:extLst>
                 </a:gridCol>
@@ -10698,7 +10692,7 @@
                 </a:tc>
                 <a:extLst>
                   <a:ext uri="{0D108BD9-81ED-4DB2-BD59-A6C34878D82A}">
-                    <a16:rowId xmlns:a16="http://schemas.microsoft.com/office/drawing/2014/main" xmlns="" val="10000"/>
+                    <a16:rowId xmlns="" xmlns:a16="http://schemas.microsoft.com/office/drawing/2014/main" val="10000"/>
                   </a:ext>
                 </a:extLst>
               </a:tr>
@@ -10828,7 +10822,7 @@
                 </a:tc>
                 <a:extLst>
                   <a:ext uri="{0D108BD9-81ED-4DB2-BD59-A6C34878D82A}">
-                    <a16:rowId xmlns:a16="http://schemas.microsoft.com/office/drawing/2014/main" xmlns="" val="10001"/>
+                    <a16:rowId xmlns="" xmlns:a16="http://schemas.microsoft.com/office/drawing/2014/main" val="10001"/>
                   </a:ext>
                 </a:extLst>
               </a:tr>
@@ -11005,7 +10999,7 @@
                 </a:tc>
                 <a:extLst>
                   <a:ext uri="{0D108BD9-81ED-4DB2-BD59-A6C34878D82A}">
-                    <a16:rowId xmlns:a16="http://schemas.microsoft.com/office/drawing/2014/main" xmlns="" val="10002"/>
+                    <a16:rowId xmlns="" xmlns:a16="http://schemas.microsoft.com/office/drawing/2014/main" val="10002"/>
                   </a:ext>
                 </a:extLst>
               </a:tr>
@@ -11131,7 +11125,7 @@
                 </a:tc>
                 <a:extLst>
                   <a:ext uri="{0D108BD9-81ED-4DB2-BD59-A6C34878D82A}">
-                    <a16:rowId xmlns:a16="http://schemas.microsoft.com/office/drawing/2014/main" xmlns="" val="10003"/>
+                    <a16:rowId xmlns="" xmlns:a16="http://schemas.microsoft.com/office/drawing/2014/main" val="10003"/>
                   </a:ext>
                 </a:extLst>
               </a:tr>
@@ -11638,28 +11632,28 @@
                 <a:gridCol w="1204637">
                   <a:extLst>
                     <a:ext uri="{9D8B030D-6E8A-4147-A177-3AD203B41FA5}">
-                      <a16:colId xmlns:a16="http://schemas.microsoft.com/office/drawing/2014/main" xmlns="" val="20000"/>
+                      <a16:colId xmlns="" xmlns:a16="http://schemas.microsoft.com/office/drawing/2014/main" val="20000"/>
                     </a:ext>
                   </a:extLst>
                 </a:gridCol>
                 <a:gridCol w="960106">
                   <a:extLst>
                     <a:ext uri="{9D8B030D-6E8A-4147-A177-3AD203B41FA5}">
-                      <a16:colId xmlns:a16="http://schemas.microsoft.com/office/drawing/2014/main" xmlns="" val="20001"/>
+                      <a16:colId xmlns="" xmlns:a16="http://schemas.microsoft.com/office/drawing/2014/main" val="20001"/>
                     </a:ext>
                   </a:extLst>
                 </a:gridCol>
                 <a:gridCol w="1326902">
                   <a:extLst>
                     <a:ext uri="{9D8B030D-6E8A-4147-A177-3AD203B41FA5}">
-                      <a16:colId xmlns:a16="http://schemas.microsoft.com/office/drawing/2014/main" xmlns="" val="20002"/>
+                      <a16:colId xmlns="" xmlns:a16="http://schemas.microsoft.com/office/drawing/2014/main" val="20002"/>
                     </a:ext>
                   </a:extLst>
                 </a:gridCol>
                 <a:gridCol w="1326902">
                   <a:extLst>
                     <a:ext uri="{9D8B030D-6E8A-4147-A177-3AD203B41FA5}">
-                      <a16:colId xmlns:a16="http://schemas.microsoft.com/office/drawing/2014/main" xmlns="" val="20003"/>
+                      <a16:colId xmlns="" xmlns:a16="http://schemas.microsoft.com/office/drawing/2014/main" val="20003"/>
                     </a:ext>
                   </a:extLst>
                 </a:gridCol>
@@ -11727,7 +11721,7 @@
                 </a:tc>
                 <a:extLst>
                   <a:ext uri="{0D108BD9-81ED-4DB2-BD59-A6C34878D82A}">
-                    <a16:rowId xmlns:a16="http://schemas.microsoft.com/office/drawing/2014/main" xmlns="" val="10000"/>
+                    <a16:rowId xmlns="" xmlns:a16="http://schemas.microsoft.com/office/drawing/2014/main" val="10000"/>
                   </a:ext>
                 </a:extLst>
               </a:tr>
@@ -11782,7 +11776,7 @@
                 </a:tc>
                 <a:extLst>
                   <a:ext uri="{0D108BD9-81ED-4DB2-BD59-A6C34878D82A}">
-                    <a16:rowId xmlns:a16="http://schemas.microsoft.com/office/drawing/2014/main" xmlns="" val="10001"/>
+                    <a16:rowId xmlns="" xmlns:a16="http://schemas.microsoft.com/office/drawing/2014/main" val="10001"/>
                   </a:ext>
                 </a:extLst>
               </a:tr>
@@ -11837,7 +11831,7 @@
                 </a:tc>
                 <a:extLst>
                   <a:ext uri="{0D108BD9-81ED-4DB2-BD59-A6C34878D82A}">
-                    <a16:rowId xmlns:a16="http://schemas.microsoft.com/office/drawing/2014/main" xmlns="" val="10002"/>
+                    <a16:rowId xmlns="" xmlns:a16="http://schemas.microsoft.com/office/drawing/2014/main" val="10002"/>
                   </a:ext>
                 </a:extLst>
               </a:tr>
@@ -11892,7 +11886,7 @@
                 </a:tc>
                 <a:extLst>
                   <a:ext uri="{0D108BD9-81ED-4DB2-BD59-A6C34878D82A}">
-                    <a16:rowId xmlns:a16="http://schemas.microsoft.com/office/drawing/2014/main" xmlns="" val="10003"/>
+                    <a16:rowId xmlns="" xmlns:a16="http://schemas.microsoft.com/office/drawing/2014/main" val="10003"/>
                   </a:ext>
                 </a:extLst>
               </a:tr>
@@ -11947,7 +11941,7 @@
                 </a:tc>
                 <a:extLst>
                   <a:ext uri="{0D108BD9-81ED-4DB2-BD59-A6C34878D82A}">
-                    <a16:rowId xmlns:a16="http://schemas.microsoft.com/office/drawing/2014/main" xmlns="" val="10004"/>
+                    <a16:rowId xmlns="" xmlns:a16="http://schemas.microsoft.com/office/drawing/2014/main" val="10004"/>
                   </a:ext>
                 </a:extLst>
               </a:tr>
@@ -12002,7 +11996,7 @@
                 </a:tc>
                 <a:extLst>
                   <a:ext uri="{0D108BD9-81ED-4DB2-BD59-A6C34878D82A}">
-                    <a16:rowId xmlns:a16="http://schemas.microsoft.com/office/drawing/2014/main" xmlns="" val="10005"/>
+                    <a16:rowId xmlns="" xmlns:a16="http://schemas.microsoft.com/office/drawing/2014/main" val="10005"/>
                   </a:ext>
                 </a:extLst>
               </a:tr>

</xml_diff>